<commit_message>
Updated steps to create PSF
</commit_message>
<xml_diff>
--- a/Steps to create PSF.pptx
+++ b/Steps to create PSF.pptx
@@ -244,7 +244,7 @@
           <a:p>
             <a:fld id="{95ADFDE3-7897-47FC-B155-301B152D54F1}" type="datetimeFigureOut">
               <a:rPr lang="en-US" smtClean="0"/>
-              <a:t>11/24/2021</a:t>
+              <a:t>8/8/2022</a:t>
             </a:fld>
             <a:endParaRPr lang="en-US"/>
           </a:p>
@@ -414,7 +414,7 @@
           <a:p>
             <a:fld id="{95ADFDE3-7897-47FC-B155-301B152D54F1}" type="datetimeFigureOut">
               <a:rPr lang="en-US" smtClean="0"/>
-              <a:t>11/24/2021</a:t>
+              <a:t>8/8/2022</a:t>
             </a:fld>
             <a:endParaRPr lang="en-US"/>
           </a:p>
@@ -594,7 +594,7 @@
           <a:p>
             <a:fld id="{95ADFDE3-7897-47FC-B155-301B152D54F1}" type="datetimeFigureOut">
               <a:rPr lang="en-US" smtClean="0"/>
-              <a:t>11/24/2021</a:t>
+              <a:t>8/8/2022</a:t>
             </a:fld>
             <a:endParaRPr lang="en-US"/>
           </a:p>
@@ -764,7 +764,7 @@
           <a:p>
             <a:fld id="{95ADFDE3-7897-47FC-B155-301B152D54F1}" type="datetimeFigureOut">
               <a:rPr lang="en-US" smtClean="0"/>
-              <a:t>11/24/2021</a:t>
+              <a:t>8/8/2022</a:t>
             </a:fld>
             <a:endParaRPr lang="en-US"/>
           </a:p>
@@ -1010,7 +1010,7 @@
           <a:p>
             <a:fld id="{95ADFDE3-7897-47FC-B155-301B152D54F1}" type="datetimeFigureOut">
               <a:rPr lang="en-US" smtClean="0"/>
-              <a:t>11/24/2021</a:t>
+              <a:t>8/8/2022</a:t>
             </a:fld>
             <a:endParaRPr lang="en-US"/>
           </a:p>
@@ -1242,7 +1242,7 @@
           <a:p>
             <a:fld id="{95ADFDE3-7897-47FC-B155-301B152D54F1}" type="datetimeFigureOut">
               <a:rPr lang="en-US" smtClean="0"/>
-              <a:t>11/24/2021</a:t>
+              <a:t>8/8/2022</a:t>
             </a:fld>
             <a:endParaRPr lang="en-US"/>
           </a:p>
@@ -1609,7 +1609,7 @@
           <a:p>
             <a:fld id="{95ADFDE3-7897-47FC-B155-301B152D54F1}" type="datetimeFigureOut">
               <a:rPr lang="en-US" smtClean="0"/>
-              <a:t>11/24/2021</a:t>
+              <a:t>8/8/2022</a:t>
             </a:fld>
             <a:endParaRPr lang="en-US"/>
           </a:p>
@@ -1727,7 +1727,7 @@
           <a:p>
             <a:fld id="{95ADFDE3-7897-47FC-B155-301B152D54F1}" type="datetimeFigureOut">
               <a:rPr lang="en-US" smtClean="0"/>
-              <a:t>11/24/2021</a:t>
+              <a:t>8/8/2022</a:t>
             </a:fld>
             <a:endParaRPr lang="en-US"/>
           </a:p>
@@ -1822,7 +1822,7 @@
           <a:p>
             <a:fld id="{95ADFDE3-7897-47FC-B155-301B152D54F1}" type="datetimeFigureOut">
               <a:rPr lang="en-US" smtClean="0"/>
-              <a:t>11/24/2021</a:t>
+              <a:t>8/8/2022</a:t>
             </a:fld>
             <a:endParaRPr lang="en-US"/>
           </a:p>
@@ -2099,7 +2099,7 @@
           <a:p>
             <a:fld id="{95ADFDE3-7897-47FC-B155-301B152D54F1}" type="datetimeFigureOut">
               <a:rPr lang="en-US" smtClean="0"/>
-              <a:t>11/24/2021</a:t>
+              <a:t>8/8/2022</a:t>
             </a:fld>
             <a:endParaRPr lang="en-US"/>
           </a:p>
@@ -2352,7 +2352,7 @@
           <a:p>
             <a:fld id="{95ADFDE3-7897-47FC-B155-301B152D54F1}" type="datetimeFigureOut">
               <a:rPr lang="en-US" smtClean="0"/>
-              <a:t>11/24/2021</a:t>
+              <a:t>8/8/2022</a:t>
             </a:fld>
             <a:endParaRPr lang="en-US"/>
           </a:p>
@@ -2565,7 +2565,7 @@
           <a:p>
             <a:fld id="{95ADFDE3-7897-47FC-B155-301B152D54F1}" type="datetimeFigureOut">
               <a:rPr lang="en-US" smtClean="0"/>
-              <a:t>11/24/2021</a:t>
+              <a:t>8/8/2022</a:t>
             </a:fld>
             <a:endParaRPr lang="en-US"/>
           </a:p>
@@ -2980,14 +2980,27 @@
             <p:ph type="ctrTitle"/>
           </p:nvPr>
         </p:nvSpPr>
-        <p:spPr/>
+        <p:spPr>
+          <a:xfrm>
+            <a:off x="85344" y="1122363"/>
+            <a:ext cx="12106656" cy="2387600"/>
+          </a:xfrm>
+        </p:spPr>
         <p:txBody>
           <a:bodyPr/>
           <a:lstStyle/>
           <a:p>
             <a:r>
               <a:rPr lang="en-US" dirty="0" smtClean="0"/>
-              <a:t>New Uploader for CODEX multicycle Data</a:t>
+              <a:t>RAPID for </a:t>
+            </a:r>
+            <a:r>
+              <a:rPr lang="en-US" dirty="0" smtClean="0"/>
+              <a:t>CODEX </a:t>
+            </a:r>
+            <a:r>
+              <a:rPr lang="en-US" dirty="0" smtClean="0"/>
+              <a:t>Image Processing</a:t>
             </a:r>
             <a:endParaRPr lang="en-US" dirty="0"/>
           </a:p>
@@ -3154,26 +3167,22 @@
             <a:pPr lvl="1"/>
             <a:r>
               <a:rPr lang="en-US" dirty="0" smtClean="0"/>
-              <a:t>Wavelength (nm; excitation/</a:t>
-            </a:r>
-            <a:r>
-              <a:rPr lang="en-US" dirty="0" smtClean="0">
-                <a:solidFill>
-                  <a:srgbClr val="FF0000"/>
-                </a:solidFill>
-              </a:rPr>
-              <a:t>emission</a:t>
+              <a:t>Wavelength (</a:t>
             </a:r>
             <a:r>
               <a:rPr lang="en-US" dirty="0" smtClean="0"/>
-              <a:t>): input emission wavelength </a:t>
+              <a:t>nm): </a:t>
+            </a:r>
+            <a:r>
+              <a:rPr lang="en-US" dirty="0" smtClean="0"/>
+              <a:t>input emission wavelength </a:t>
             </a:r>
           </a:p>
           <a:p>
             <a:pPr lvl="2"/>
             <a:r>
               <a:rPr lang="en-US" dirty="0" smtClean="0"/>
-              <a:t>DAPI: 358/</a:t>
+              <a:t>DAPI: </a:t>
             </a:r>
             <a:r>
               <a:rPr lang="en-US" dirty="0" smtClean="0">
@@ -3185,7 +3194,7 @@
             </a:r>
             <a:r>
               <a:rPr lang="en-US" dirty="0" smtClean="0"/>
-              <a:t>; GFP: 488/</a:t>
+              <a:t>; GFP: </a:t>
             </a:r>
             <a:r>
               <a:rPr lang="en-US" dirty="0" smtClean="0">
@@ -3197,7 +3206,7 @@
             </a:r>
             <a:r>
               <a:rPr lang="en-US" dirty="0" smtClean="0"/>
-              <a:t>; Cy3: 532/</a:t>
+              <a:t>; Cy3: </a:t>
             </a:r>
             <a:r>
               <a:rPr lang="en-US" dirty="0" smtClean="0">
@@ -3209,7 +3218,7 @@
             </a:r>
             <a:r>
               <a:rPr lang="en-US" dirty="0" smtClean="0"/>
-              <a:t>; Cy5: 651/</a:t>
+              <a:t>; Cy5: </a:t>
             </a:r>
             <a:r>
               <a:rPr lang="en-US" dirty="0" smtClean="0">
@@ -3219,6 +3228,11 @@
               </a:rPr>
               <a:t>670</a:t>
             </a:r>
+            <a:endParaRPr lang="en-US" dirty="0" smtClean="0">
+              <a:solidFill>
+                <a:srgbClr val="FF0000"/>
+              </a:solidFill>
+            </a:endParaRPr>
           </a:p>
           <a:p>
             <a:pPr lvl="1"/>
@@ -3284,22 +3298,21 @@
       </p:sp>
       <p:pic>
         <p:nvPicPr>
-          <p:cNvPr id="4" name="Picture 3"/>
+          <p:cNvPr id="5" name="Picture 4"/>
           <p:cNvPicPr>
             <a:picLocks noChangeAspect="1"/>
           </p:cNvPicPr>
           <p:nvPr/>
         </p:nvPicPr>
-        <p:blipFill>
+        <p:blipFill rotWithShape="1">
           <a:blip r:embed="rId3"/>
-          <a:stretch>
-            <a:fillRect/>
-          </a:stretch>
+          <a:srcRect l="1559" t="1459" r="3163" b="1718"/>
+          <a:stretch/>
         </p:blipFill>
         <p:spPr>
           <a:xfrm>
-            <a:off x="8634778" y="1296194"/>
-            <a:ext cx="2924175" cy="5410200"/>
+            <a:off x="9118732" y="1231392"/>
+            <a:ext cx="2963539" cy="5577840"/>
           </a:xfrm>
           <a:prstGeom prst="rect">
             <a:avLst/>

</xml_diff>